<commit_message>
edit final báo cáo
</commit_message>
<xml_diff>
--- a/BaoCao.pptx
+++ b/BaoCao.pptx
@@ -49,29 +49,29 @@
       <p:regular r:id="rId35"/>
     </p:embeddedFont>
     <p:embeddedFont>
-      <p:font typeface="Dosis" panose="020B0604020202020204" charset="0"/>
+      <p:font typeface="Source Sans Pro" panose="020B0604020202020204" charset="0"/>
       <p:regular r:id="rId36"/>
       <p:bold r:id="rId37"/>
+      <p:italic r:id="rId38"/>
+      <p:boldItalic r:id="rId39"/>
     </p:embeddedFont>
     <p:embeddedFont>
       <p:font typeface="Segoe UI Light" panose="020B0502040204020203" pitchFamily="34" charset="0"/>
-      <p:regular r:id="rId38"/>
-      <p:italic r:id="rId39"/>
+      <p:regular r:id="rId40"/>
+      <p:italic r:id="rId41"/>
     </p:embeddedFont>
     <p:embeddedFont>
       <p:font typeface="Segoe UI Semibold" panose="020B0702040204020203" pitchFamily="34" charset="0"/>
-      <p:bold r:id="rId40"/>
-      <p:boldItalic r:id="rId41"/>
+      <p:bold r:id="rId42"/>
+      <p:boldItalic r:id="rId43"/>
+    </p:embeddedFont>
+    <p:embeddedFont>
+      <p:font typeface="Dosis" panose="020B0604020202020204" charset="0"/>
+      <p:regular r:id="rId44"/>
+      <p:bold r:id="rId45"/>
     </p:embeddedFont>
     <p:embeddedFont>
       <p:font typeface="Segoe UI" panose="020B0502040204020203" pitchFamily="34" charset="0"/>
-      <p:regular r:id="rId42"/>
-      <p:bold r:id="rId43"/>
-      <p:italic r:id="rId44"/>
-      <p:boldItalic r:id="rId45"/>
-    </p:embeddedFont>
-    <p:embeddedFont>
-      <p:font typeface="Source Sans Pro" panose="020B0604020202020204" charset="0"/>
       <p:regular r:id="rId46"/>
       <p:bold r:id="rId47"/>
       <p:italic r:id="rId48"/>
@@ -23083,7 +23083,7 @@
               <a:rPr lang="en" dirty="0" smtClean="0">
                 <a:latin typeface="Britannic Bold" panose="020B0903060703020204" pitchFamily="34" charset="0"/>
               </a:rPr>
-              <a:t>16</a:t>
+              <a:t>10</a:t>
             </a:r>
             <a:endParaRPr lang="en" dirty="0">
               <a:latin typeface="Britannic Bold" panose="020B0903060703020204" pitchFamily="34" charset="0"/>
@@ -23717,7 +23717,7 @@
               <a:rPr lang="en" dirty="0" smtClean="0">
                 <a:latin typeface="Britannic Bold" panose="020B0903060703020204" pitchFamily="34" charset="0"/>
               </a:rPr>
-              <a:t>18</a:t>
+              <a:t>11</a:t>
             </a:r>
             <a:endParaRPr lang="en" dirty="0">
               <a:latin typeface="Britannic Bold" panose="020B0903060703020204" pitchFamily="34" charset="0"/>
@@ -24343,7 +24343,7 @@
               <a:rPr lang="en" dirty="0" smtClean="0">
                 <a:latin typeface="Britannic Bold" panose="020B0903060703020204" pitchFamily="34" charset="0"/>
               </a:rPr>
-              <a:t>19</a:t>
+              <a:t>12</a:t>
             </a:r>
             <a:endParaRPr lang="en" dirty="0">
               <a:latin typeface="Britannic Bold" panose="020B0903060703020204" pitchFamily="34" charset="0"/>
@@ -24650,7 +24650,7 @@
               <a:rPr lang="en" dirty="0" smtClean="0">
                 <a:latin typeface="Britannic Bold" panose="020B0903060703020204" pitchFamily="34" charset="0"/>
               </a:rPr>
-              <a:t>20</a:t>
+              <a:t>13</a:t>
             </a:r>
             <a:endParaRPr lang="en" dirty="0">
               <a:latin typeface="Britannic Bold" panose="020B0903060703020204" pitchFamily="34" charset="0"/>
@@ -26227,7 +26227,7 @@
               <a:rPr lang="en" dirty="0" smtClean="0">
                 <a:latin typeface="Britannic Bold" panose="020B0903060703020204" pitchFamily="34" charset="0"/>
               </a:rPr>
-              <a:t>21</a:t>
+              <a:t>14</a:t>
             </a:r>
             <a:endParaRPr lang="en" dirty="0">
               <a:latin typeface="Britannic Bold" panose="020B0903060703020204" pitchFamily="34" charset="0"/>
@@ -27064,7 +27064,7 @@
               <a:rPr lang="en" dirty="0" smtClean="0">
                 <a:latin typeface="Britannic Bold" panose="020B0903060703020204" pitchFamily="34" charset="0"/>
               </a:rPr>
-              <a:t>22</a:t>
+              <a:t>15</a:t>
             </a:r>
             <a:endParaRPr lang="en" dirty="0">
               <a:latin typeface="Britannic Bold" panose="020B0903060703020204" pitchFamily="34" charset="0"/>
@@ -28836,7 +28836,7 @@
               <a:rPr lang="en" dirty="0" smtClean="0">
                 <a:latin typeface="Britannic Bold" panose="020B0903060703020204" pitchFamily="34" charset="0"/>
               </a:rPr>
-              <a:t>24</a:t>
+              <a:t>17</a:t>
             </a:r>
             <a:endParaRPr lang="en" dirty="0">
               <a:latin typeface="Britannic Bold" panose="020B0903060703020204" pitchFamily="34" charset="0"/>
@@ -30663,7 +30663,7 @@
               <a:rPr lang="en" dirty="0" smtClean="0">
                 <a:latin typeface="Britannic Bold" panose="020B0903060703020204" pitchFamily="34" charset="0"/>
               </a:rPr>
-              <a:t>25</a:t>
+              <a:t>18</a:t>
             </a:r>
             <a:endParaRPr lang="en" dirty="0">
               <a:latin typeface="Britannic Bold" panose="020B0903060703020204" pitchFamily="34" charset="0"/>
@@ -32231,7 +32231,7 @@
               <a:rPr lang="en" dirty="0" smtClean="0">
                 <a:latin typeface="Britannic Bold" panose="020B0903060703020204" pitchFamily="34" charset="0"/>
               </a:rPr>
-              <a:t>27</a:t>
+              <a:t>20</a:t>
             </a:r>
             <a:endParaRPr lang="en" dirty="0">
               <a:latin typeface="Britannic Bold" panose="020B0903060703020204" pitchFamily="34" charset="0"/>
@@ -33543,7 +33543,7 @@
               <a:rPr lang="en" dirty="0" smtClean="0">
                 <a:latin typeface="Britannic Bold" panose="020B0903060703020204" pitchFamily="34" charset="0"/>
               </a:rPr>
-              <a:t>29</a:t>
+              <a:t>22</a:t>
             </a:r>
             <a:endParaRPr lang="en" dirty="0">
               <a:latin typeface="Britannic Bold" panose="020B0903060703020204" pitchFamily="34" charset="0"/>
@@ -34177,7 +34177,7 @@
               <a:rPr lang="en" dirty="0" smtClean="0">
                 <a:latin typeface="Britannic Bold" panose="020B0903060703020204" pitchFamily="34" charset="0"/>
               </a:rPr>
-              <a:t>30</a:t>
+              <a:t>23</a:t>
             </a:r>
             <a:endParaRPr lang="en" dirty="0">
               <a:latin typeface="Britannic Bold" panose="020B0903060703020204" pitchFamily="34" charset="0"/>
@@ -40166,19 +40166,25 @@
               <a:rPr lang="en-US" sz="2000" i="1" dirty="0" smtClean="0">
                 <a:latin typeface="Source Sans Pro" panose="020B0604020202020204" charset="0"/>
               </a:rPr>
-              <a:t> </a:t>
+              <a:t> 100% </a:t>
+            </a:r>
+            <a:r>
+              <a:rPr lang="en-US" sz="2000" i="1" dirty="0" err="1" smtClean="0">
+                <a:latin typeface="Source Sans Pro" panose="020B0604020202020204" charset="0"/>
+              </a:rPr>
+              <a:t>các</a:t>
             </a:r>
             <a:r>
               <a:rPr lang="en-US" sz="2000" i="1" dirty="0" smtClean="0">
                 <a:latin typeface="Source Sans Pro" panose="020B0604020202020204" charset="0"/>
               </a:rPr>
-              <a:t>100% </a:t>
+              <a:t> </a:t>
             </a:r>
             <a:r>
               <a:rPr lang="en-US" sz="2000" i="1" dirty="0" err="1" smtClean="0">
                 <a:latin typeface="Source Sans Pro" panose="020B0604020202020204" charset="0"/>
               </a:rPr>
-              <a:t>các</a:t>
+              <a:t>dịch</a:t>
             </a:r>
             <a:r>
               <a:rPr lang="en-US" sz="2000" i="1" dirty="0" smtClean="0">
@@ -40190,7 +40196,7 @@
               <a:rPr lang="en-US" sz="2000" i="1" dirty="0" err="1" smtClean="0">
                 <a:latin typeface="Source Sans Pro" panose="020B0604020202020204" charset="0"/>
               </a:rPr>
-              <a:t>dịch</a:t>
+              <a:t>vụ</a:t>
             </a:r>
             <a:r>
               <a:rPr lang="en-US" sz="2000" i="1" dirty="0" smtClean="0">
@@ -40202,7 +40208,7 @@
               <a:rPr lang="en-US" sz="2000" i="1" dirty="0" err="1" smtClean="0">
                 <a:latin typeface="Source Sans Pro" panose="020B0604020202020204" charset="0"/>
               </a:rPr>
-              <a:t>vụ</a:t>
+              <a:t>công</a:t>
             </a:r>
             <a:r>
               <a:rPr lang="en-US" sz="2000" i="1" dirty="0" smtClean="0">
@@ -40214,7 +40220,7 @@
               <a:rPr lang="en-US" sz="2000" i="1" dirty="0" err="1" smtClean="0">
                 <a:latin typeface="Source Sans Pro" panose="020B0604020202020204" charset="0"/>
               </a:rPr>
-              <a:t>công</a:t>
+              <a:t>được</a:t>
             </a:r>
             <a:r>
               <a:rPr lang="en-US" sz="2000" i="1" dirty="0" smtClean="0">
@@ -40226,7 +40232,7 @@
               <a:rPr lang="en-US" sz="2000" i="1" dirty="0" err="1" smtClean="0">
                 <a:latin typeface="Source Sans Pro" panose="020B0604020202020204" charset="0"/>
               </a:rPr>
-              <a:t>được</a:t>
+              <a:t>cung</a:t>
             </a:r>
             <a:r>
               <a:rPr lang="en-US" sz="2000" i="1" dirty="0" smtClean="0">
@@ -40238,7 +40244,7 @@
               <a:rPr lang="en-US" sz="2000" i="1" dirty="0" err="1" smtClean="0">
                 <a:latin typeface="Source Sans Pro" panose="020B0604020202020204" charset="0"/>
               </a:rPr>
-              <a:t>cung</a:t>
+              <a:t>cấp</a:t>
             </a:r>
             <a:r>
               <a:rPr lang="en-US" sz="2000" i="1" dirty="0" smtClean="0">
@@ -40250,7 +40256,7 @@
               <a:rPr lang="en-US" sz="2000" i="1" dirty="0" err="1" smtClean="0">
                 <a:latin typeface="Source Sans Pro" panose="020B0604020202020204" charset="0"/>
               </a:rPr>
-              <a:t>cấp</a:t>
+              <a:t>cho</a:t>
             </a:r>
             <a:r>
               <a:rPr lang="en-US" sz="2000" i="1" dirty="0" smtClean="0">
@@ -40262,7 +40268,7 @@
               <a:rPr lang="en-US" sz="2000" i="1" dirty="0" err="1" smtClean="0">
                 <a:latin typeface="Source Sans Pro" panose="020B0604020202020204" charset="0"/>
               </a:rPr>
-              <a:t>cho</a:t>
+              <a:t>phép</a:t>
             </a:r>
             <a:r>
               <a:rPr lang="en-US" sz="2000" i="1" dirty="0" smtClean="0">
@@ -40274,7 +40280,7 @@
               <a:rPr lang="en-US" sz="2000" i="1" dirty="0" err="1" smtClean="0">
                 <a:latin typeface="Source Sans Pro" panose="020B0604020202020204" charset="0"/>
               </a:rPr>
-              <a:t>phép</a:t>
+              <a:t>người</a:t>
             </a:r>
             <a:r>
               <a:rPr lang="en-US" sz="2000" i="1" dirty="0" smtClean="0">
@@ -40286,7 +40292,7 @@
               <a:rPr lang="en-US" sz="2000" i="1" dirty="0" err="1" smtClean="0">
                 <a:latin typeface="Source Sans Pro" panose="020B0604020202020204" charset="0"/>
               </a:rPr>
-              <a:t>người</a:t>
+              <a:t>sử</a:t>
             </a:r>
             <a:r>
               <a:rPr lang="en-US" sz="2000" i="1" dirty="0" smtClean="0">
@@ -40298,7 +40304,7 @@
               <a:rPr lang="en-US" sz="2000" i="1" dirty="0" err="1" smtClean="0">
                 <a:latin typeface="Source Sans Pro" panose="020B0604020202020204" charset="0"/>
               </a:rPr>
-              <a:t>sử</a:t>
+              <a:t>dụng</a:t>
             </a:r>
             <a:r>
               <a:rPr lang="en-US" sz="2000" i="1" dirty="0" smtClean="0">
@@ -40310,7 +40316,7 @@
               <a:rPr lang="en-US" sz="2000" i="1" dirty="0" err="1" smtClean="0">
                 <a:latin typeface="Source Sans Pro" panose="020B0604020202020204" charset="0"/>
               </a:rPr>
-              <a:t>dụng</a:t>
+              <a:t>điền</a:t>
             </a:r>
             <a:r>
               <a:rPr lang="en-US" sz="2000" i="1" dirty="0" smtClean="0">
@@ -40322,7 +40328,7 @@
               <a:rPr lang="en-US" sz="2000" i="1" dirty="0" err="1" smtClean="0">
                 <a:latin typeface="Source Sans Pro" panose="020B0604020202020204" charset="0"/>
               </a:rPr>
-              <a:t>điền</a:t>
+              <a:t>và</a:t>
             </a:r>
             <a:r>
               <a:rPr lang="en-US" sz="2000" i="1" dirty="0" smtClean="0">
@@ -40334,7 +40340,7 @@
               <a:rPr lang="en-US" sz="2000" i="1" dirty="0" err="1" smtClean="0">
                 <a:latin typeface="Source Sans Pro" panose="020B0604020202020204" charset="0"/>
               </a:rPr>
-              <a:t>và</a:t>
+              <a:t>gửi</a:t>
             </a:r>
             <a:r>
               <a:rPr lang="en-US" sz="2000" i="1" dirty="0" smtClean="0">
@@ -40346,7 +40352,7 @@
               <a:rPr lang="en-US" sz="2000" i="1" dirty="0" err="1" smtClean="0">
                 <a:latin typeface="Source Sans Pro" panose="020B0604020202020204" charset="0"/>
               </a:rPr>
-              <a:t>gửi</a:t>
+              <a:t>trực</a:t>
             </a:r>
             <a:r>
               <a:rPr lang="en-US" sz="2000" i="1" dirty="0" smtClean="0">
@@ -40358,7 +40364,7 @@
               <a:rPr lang="en-US" sz="2000" i="1" dirty="0" err="1" smtClean="0">
                 <a:latin typeface="Source Sans Pro" panose="020B0604020202020204" charset="0"/>
               </a:rPr>
-              <a:t>trực</a:t>
+              <a:t>tuyến</a:t>
             </a:r>
             <a:r>
               <a:rPr lang="en-US" sz="2000" i="1" dirty="0" smtClean="0">
@@ -40370,7 +40376,7 @@
               <a:rPr lang="en-US" sz="2000" i="1" dirty="0" err="1" smtClean="0">
                 <a:latin typeface="Source Sans Pro" panose="020B0604020202020204" charset="0"/>
               </a:rPr>
-              <a:t>tuyến</a:t>
+              <a:t>các</a:t>
             </a:r>
             <a:r>
               <a:rPr lang="en-US" sz="2000" i="1" dirty="0" smtClean="0">
@@ -40382,7 +40388,7 @@
               <a:rPr lang="en-US" sz="2000" i="1" dirty="0" err="1" smtClean="0">
                 <a:latin typeface="Source Sans Pro" panose="020B0604020202020204" charset="0"/>
               </a:rPr>
-              <a:t>các</a:t>
+              <a:t>mẫu</a:t>
             </a:r>
             <a:r>
               <a:rPr lang="en-US" sz="2000" i="1" dirty="0" smtClean="0">
@@ -40394,7 +40400,7 @@
               <a:rPr lang="en-US" sz="2000" i="1" dirty="0" err="1" smtClean="0">
                 <a:latin typeface="Source Sans Pro" panose="020B0604020202020204" charset="0"/>
               </a:rPr>
-              <a:t>mẫu</a:t>
+              <a:t>văn</a:t>
             </a:r>
             <a:r>
               <a:rPr lang="en-US" sz="2000" i="1" dirty="0" smtClean="0">
@@ -40406,7 +40412,7 @@
               <a:rPr lang="en-US" sz="2000" i="1" dirty="0" err="1" smtClean="0">
                 <a:latin typeface="Source Sans Pro" panose="020B0604020202020204" charset="0"/>
               </a:rPr>
-              <a:t>văn</a:t>
+              <a:t>bản</a:t>
             </a:r>
             <a:r>
               <a:rPr lang="en-US" sz="2000" i="1" dirty="0" smtClean="0">
@@ -40418,7 +40424,7 @@
               <a:rPr lang="en-US" sz="2000" i="1" dirty="0" err="1" smtClean="0">
                 <a:latin typeface="Source Sans Pro" panose="020B0604020202020204" charset="0"/>
               </a:rPr>
-              <a:t>bản</a:t>
+              <a:t>đến</a:t>
             </a:r>
             <a:r>
               <a:rPr lang="en-US" sz="2000" i="1" dirty="0" smtClean="0">
@@ -40430,7 +40436,7 @@
               <a:rPr lang="en-US" sz="2000" i="1" dirty="0" err="1" smtClean="0">
                 <a:latin typeface="Source Sans Pro" panose="020B0604020202020204" charset="0"/>
               </a:rPr>
-              <a:t>đến</a:t>
+              <a:t>các</a:t>
             </a:r>
             <a:r>
               <a:rPr lang="en-US" sz="2000" i="1" dirty="0" smtClean="0">
@@ -40442,7 +40448,7 @@
               <a:rPr lang="en-US" sz="2000" i="1" dirty="0" err="1" smtClean="0">
                 <a:latin typeface="Source Sans Pro" panose="020B0604020202020204" charset="0"/>
               </a:rPr>
-              <a:t>các</a:t>
+              <a:t>cơ</a:t>
             </a:r>
             <a:r>
               <a:rPr lang="en-US" sz="2000" i="1" dirty="0" smtClean="0">
@@ -40454,53 +40460,38 @@
               <a:rPr lang="en-US" sz="2000" i="1" dirty="0" err="1" smtClean="0">
                 <a:latin typeface="Source Sans Pro" panose="020B0604020202020204" charset="0"/>
               </a:rPr>
-              <a:t>cơ</a:t>
+              <a:t>quan</a:t>
             </a:r>
             <a:r>
               <a:rPr lang="en-US" sz="2000" i="1" dirty="0" smtClean="0">
                 <a:latin typeface="Source Sans Pro" panose="020B0604020202020204" charset="0"/>
               </a:rPr>
-              <a:t> </a:t>
+              <a:t>, </a:t>
             </a:r>
             <a:r>
               <a:rPr lang="en-US" sz="2000" i="1" dirty="0" err="1" smtClean="0">
                 <a:latin typeface="Source Sans Pro" panose="020B0604020202020204" charset="0"/>
               </a:rPr>
-              <a:t>quan</a:t>
+              <a:t>tổ</a:t>
             </a:r>
             <a:r>
               <a:rPr lang="en-US" sz="2000" i="1" dirty="0" smtClean="0">
                 <a:latin typeface="Source Sans Pro" panose="020B0604020202020204" charset="0"/>
               </a:rPr>
-              <a:t>, </a:t>
+              <a:t> </a:t>
             </a:r>
             <a:r>
               <a:rPr lang="en-US" sz="2000" i="1" dirty="0" err="1" smtClean="0">
                 <a:latin typeface="Source Sans Pro" panose="020B0604020202020204" charset="0"/>
               </a:rPr>
-              <a:t>tổ</a:t>
+              <a:t>chức</a:t>
             </a:r>
             <a:r>
               <a:rPr lang="en-US" sz="2000" i="1" dirty="0" smtClean="0">
                 <a:latin typeface="Source Sans Pro" panose="020B0604020202020204" charset="0"/>
               </a:rPr>
-              <a:t> </a:t>
-            </a:r>
-            <a:r>
-              <a:rPr lang="en-US" sz="2000" i="1" dirty="0" err="1" smtClean="0">
-                <a:latin typeface="Source Sans Pro" panose="020B0604020202020204" charset="0"/>
-              </a:rPr>
-              <a:t>chức</a:t>
-            </a:r>
-            <a:r>
-              <a:rPr lang="en-US" sz="2000" i="1" dirty="0" smtClean="0">
-                <a:latin typeface="Source Sans Pro" panose="020B0604020202020204" charset="0"/>
-              </a:rPr>
               <a:t>”</a:t>
             </a:r>
-            <a:endParaRPr lang="en-US" sz="2000" i="1" dirty="0" smtClean="0">
-              <a:latin typeface="Source Sans Pro" panose="020B0604020202020204" charset="0"/>
-            </a:endParaRPr>
           </a:p>
           <a:p>
             <a:pPr algn="just"/>
@@ -43276,7 +43267,7 @@
               <a:rPr lang="en" dirty="0" smtClean="0">
                 <a:latin typeface="Britannic Bold" panose="020B0903060703020204" pitchFamily="34" charset="0"/>
               </a:rPr>
-              <a:t>9</a:t>
+              <a:t>7</a:t>
             </a:r>
             <a:endParaRPr lang="en" dirty="0">
               <a:latin typeface="Britannic Bold" panose="020B0903060703020204" pitchFamily="34" charset="0"/>
@@ -43385,8 +43376,8 @@
         </p:blipFill>
         <p:spPr>
           <a:xfrm>
-            <a:off x="749100" y="3259413"/>
-            <a:ext cx="2507617" cy="1441880"/>
+            <a:off x="4006209" y="1556877"/>
+            <a:ext cx="2031354" cy="1168029"/>
           </a:xfrm>
           <a:prstGeom prst="rect">
             <a:avLst/>
@@ -43395,7 +43386,7 @@
       </p:pic>
       <p:pic>
         <p:nvPicPr>
-          <p:cNvPr id="9" name="Picture 8"/>
+          <p:cNvPr id="12" name="Picture 11"/>
           <p:cNvPicPr>
             <a:picLocks noChangeAspect="1"/>
           </p:cNvPicPr>
@@ -43415,27 +43406,17 @@
         </p:blipFill>
         <p:spPr>
           <a:xfrm>
-            <a:off x="3423334" y="1556877"/>
-            <a:ext cx="3413418" cy="1168029"/>
+            <a:off x="4186886" y="3027569"/>
+            <a:ext cx="1905569" cy="1905569"/>
           </a:xfrm>
           <a:prstGeom prst="rect">
             <a:avLst/>
           </a:prstGeom>
-          <a:ln>
-            <a:noFill/>
-          </a:ln>
-          <a:effectLst>
-            <a:outerShdw blurRad="292100" dist="139700" dir="2700000" algn="tl" rotWithShape="0">
-              <a:srgbClr val="333333">
-                <a:alpha val="65000"/>
-              </a:srgbClr>
-            </a:outerShdw>
-          </a:effectLst>
         </p:spPr>
       </p:pic>
       <p:pic>
         <p:nvPicPr>
-          <p:cNvPr id="12" name="Picture 11"/>
+          <p:cNvPr id="2" name="Picture 1"/>
           <p:cNvPicPr>
             <a:picLocks noChangeAspect="1"/>
           </p:cNvPicPr>
@@ -43455,8 +43436,8 @@
         </p:blipFill>
         <p:spPr>
           <a:xfrm>
-            <a:off x="4186886" y="3027569"/>
-            <a:ext cx="1905569" cy="1905569"/>
+            <a:off x="1143142" y="3027568"/>
+            <a:ext cx="1909290" cy="1905569"/>
           </a:xfrm>
           <a:prstGeom prst="rect">
             <a:avLst/>
@@ -44535,34 +44516,237 @@
       </p:cxnSp>
       <p:sp>
         <p:nvSpPr>
-          <p:cNvPr id="8" name="Shape 107"/>
+          <p:cNvPr id="10" name="Shape 107"/>
           <p:cNvSpPr txBox="1">
-            <a:spLocks noGrp="1"/>
+            <a:spLocks/>
           </p:cNvSpPr>
-          <p:nvPr>
-            <p:ph type="sldNum" idx="12"/>
-          </p:nvPr>
+          <p:nvPr/>
         </p:nvSpPr>
         <p:spPr>
           <a:xfrm>
-            <a:off x="6315075" y="4793381"/>
-            <a:ext cx="437050" cy="350119"/>
+            <a:off x="6513825" y="4793381"/>
+            <a:ext cx="238300" cy="350119"/>
           </a:xfrm>
           <a:prstGeom prst="rect">
             <a:avLst/>
           </a:prstGeom>
+          <a:noFill/>
+          <a:ln>
+            <a:noFill/>
+          </a:ln>
         </p:spPr>
         <p:txBody>
           <a:bodyPr lIns="91425" tIns="91425" rIns="91425" bIns="91425" anchor="b" anchorCtr="0">
             <a:noAutofit/>
           </a:bodyPr>
-          <a:lstStyle/>
+          <a:lstStyle>
+            <a:defPPr marR="0" lvl="0" algn="l" rtl="0">
+              <a:lnSpc>
+                <a:spcPct val="100000"/>
+              </a:lnSpc>
+              <a:spcBef>
+                <a:spcPts val="0"/>
+              </a:spcBef>
+              <a:spcAft>
+                <a:spcPts val="0"/>
+              </a:spcAft>
+            </a:defPPr>
+            <a:lvl1pPr marR="0" lvl="0" algn="l" rtl="0">
+              <a:lnSpc>
+                <a:spcPct val="100000"/>
+              </a:lnSpc>
+              <a:spcBef>
+                <a:spcPts val="0"/>
+              </a:spcBef>
+              <a:spcAft>
+                <a:spcPts val="0"/>
+              </a:spcAft>
+              <a:buNone/>
+              <a:defRPr sz="1400" b="0" i="0" u="none" strike="noStrike" cap="none">
+                <a:solidFill>
+                  <a:srgbClr val="000000"/>
+                </a:solidFill>
+                <a:latin typeface="Arial"/>
+                <a:ea typeface="Arial"/>
+                <a:cs typeface="Arial"/>
+                <a:sym typeface="Arial"/>
+              </a:defRPr>
+            </a:lvl1pPr>
+            <a:lvl2pPr marR="0" lvl="1" algn="l" rtl="0">
+              <a:lnSpc>
+                <a:spcPct val="100000"/>
+              </a:lnSpc>
+              <a:spcBef>
+                <a:spcPts val="0"/>
+              </a:spcBef>
+              <a:spcAft>
+                <a:spcPts val="0"/>
+              </a:spcAft>
+              <a:buNone/>
+              <a:defRPr sz="1400" b="0" i="0" u="none" strike="noStrike" cap="none">
+                <a:solidFill>
+                  <a:srgbClr val="000000"/>
+                </a:solidFill>
+                <a:latin typeface="Arial"/>
+                <a:ea typeface="Arial"/>
+                <a:cs typeface="Arial"/>
+                <a:sym typeface="Arial"/>
+              </a:defRPr>
+            </a:lvl2pPr>
+            <a:lvl3pPr marR="0" lvl="2" algn="l" rtl="0">
+              <a:lnSpc>
+                <a:spcPct val="100000"/>
+              </a:lnSpc>
+              <a:spcBef>
+                <a:spcPts val="0"/>
+              </a:spcBef>
+              <a:spcAft>
+                <a:spcPts val="0"/>
+              </a:spcAft>
+              <a:buNone/>
+              <a:defRPr sz="1400" b="0" i="0" u="none" strike="noStrike" cap="none">
+                <a:solidFill>
+                  <a:srgbClr val="000000"/>
+                </a:solidFill>
+                <a:latin typeface="Arial"/>
+                <a:ea typeface="Arial"/>
+                <a:cs typeface="Arial"/>
+                <a:sym typeface="Arial"/>
+              </a:defRPr>
+            </a:lvl3pPr>
+            <a:lvl4pPr marR="0" lvl="3" algn="l" rtl="0">
+              <a:lnSpc>
+                <a:spcPct val="100000"/>
+              </a:lnSpc>
+              <a:spcBef>
+                <a:spcPts val="0"/>
+              </a:spcBef>
+              <a:spcAft>
+                <a:spcPts val="0"/>
+              </a:spcAft>
+              <a:buNone/>
+              <a:defRPr sz="1400" b="0" i="0" u="none" strike="noStrike" cap="none">
+                <a:solidFill>
+                  <a:srgbClr val="000000"/>
+                </a:solidFill>
+                <a:latin typeface="Arial"/>
+                <a:ea typeface="Arial"/>
+                <a:cs typeface="Arial"/>
+                <a:sym typeface="Arial"/>
+              </a:defRPr>
+            </a:lvl4pPr>
+            <a:lvl5pPr marR="0" lvl="4" algn="l" rtl="0">
+              <a:lnSpc>
+                <a:spcPct val="100000"/>
+              </a:lnSpc>
+              <a:spcBef>
+                <a:spcPts val="0"/>
+              </a:spcBef>
+              <a:spcAft>
+                <a:spcPts val="0"/>
+              </a:spcAft>
+              <a:buNone/>
+              <a:defRPr sz="1400" b="0" i="0" u="none" strike="noStrike" cap="none">
+                <a:solidFill>
+                  <a:srgbClr val="000000"/>
+                </a:solidFill>
+                <a:latin typeface="Arial"/>
+                <a:ea typeface="Arial"/>
+                <a:cs typeface="Arial"/>
+                <a:sym typeface="Arial"/>
+              </a:defRPr>
+            </a:lvl5pPr>
+            <a:lvl6pPr marR="0" lvl="5" algn="l" rtl="0">
+              <a:lnSpc>
+                <a:spcPct val="100000"/>
+              </a:lnSpc>
+              <a:spcBef>
+                <a:spcPts val="0"/>
+              </a:spcBef>
+              <a:spcAft>
+                <a:spcPts val="0"/>
+              </a:spcAft>
+              <a:buNone/>
+              <a:defRPr sz="1400" b="0" i="0" u="none" strike="noStrike" cap="none">
+                <a:solidFill>
+                  <a:srgbClr val="000000"/>
+                </a:solidFill>
+                <a:latin typeface="Arial"/>
+                <a:ea typeface="Arial"/>
+                <a:cs typeface="Arial"/>
+                <a:sym typeface="Arial"/>
+              </a:defRPr>
+            </a:lvl6pPr>
+            <a:lvl7pPr marR="0" lvl="6" algn="l" rtl="0">
+              <a:lnSpc>
+                <a:spcPct val="100000"/>
+              </a:lnSpc>
+              <a:spcBef>
+                <a:spcPts val="0"/>
+              </a:spcBef>
+              <a:spcAft>
+                <a:spcPts val="0"/>
+              </a:spcAft>
+              <a:buNone/>
+              <a:defRPr sz="1400" b="0" i="0" u="none" strike="noStrike" cap="none">
+                <a:solidFill>
+                  <a:srgbClr val="000000"/>
+                </a:solidFill>
+                <a:latin typeface="Arial"/>
+                <a:ea typeface="Arial"/>
+                <a:cs typeface="Arial"/>
+                <a:sym typeface="Arial"/>
+              </a:defRPr>
+            </a:lvl7pPr>
+            <a:lvl8pPr marR="0" lvl="7" algn="l" rtl="0">
+              <a:lnSpc>
+                <a:spcPct val="100000"/>
+              </a:lnSpc>
+              <a:spcBef>
+                <a:spcPts val="0"/>
+              </a:spcBef>
+              <a:spcAft>
+                <a:spcPts val="0"/>
+              </a:spcAft>
+              <a:buNone/>
+              <a:defRPr sz="1400" b="0" i="0" u="none" strike="noStrike" cap="none">
+                <a:solidFill>
+                  <a:srgbClr val="000000"/>
+                </a:solidFill>
+                <a:latin typeface="Arial"/>
+                <a:ea typeface="Arial"/>
+                <a:cs typeface="Arial"/>
+                <a:sym typeface="Arial"/>
+              </a:defRPr>
+            </a:lvl8pPr>
+            <a:lvl9pPr marR="0" lvl="8" algn="l" rtl="0">
+              <a:lnSpc>
+                <a:spcPct val="100000"/>
+              </a:lnSpc>
+              <a:spcBef>
+                <a:spcPts val="0"/>
+              </a:spcBef>
+              <a:spcAft>
+                <a:spcPts val="0"/>
+              </a:spcAft>
+              <a:buNone/>
+              <a:defRPr sz="1400" b="0" i="0" u="none" strike="noStrike" cap="none">
+                <a:solidFill>
+                  <a:srgbClr val="000000"/>
+                </a:solidFill>
+                <a:latin typeface="Arial"/>
+                <a:ea typeface="Arial"/>
+                <a:cs typeface="Arial"/>
+                <a:sym typeface="Arial"/>
+              </a:defRPr>
+            </a:lvl9pPr>
+          </a:lstStyle>
           <a:p>
             <a:r>
               <a:rPr lang="en" dirty="0" smtClean="0">
                 <a:latin typeface="Britannic Bold" panose="020B0903060703020204" pitchFamily="34" charset="0"/>
               </a:rPr>
-              <a:t>10</a:t>
+              <a:t>8</a:t>
             </a:r>
             <a:endParaRPr lang="en" dirty="0">
               <a:latin typeface="Britannic Bold" panose="020B0903060703020204" pitchFamily="34" charset="0"/>
@@ -45308,43 +45492,6 @@
           </a:p>
         </p:txBody>
       </p:sp>
-      <p:sp>
-        <p:nvSpPr>
-          <p:cNvPr id="7" name="Shape 107"/>
-          <p:cNvSpPr txBox="1">
-            <a:spLocks noGrp="1"/>
-          </p:cNvSpPr>
-          <p:nvPr>
-            <p:ph type="sldNum" idx="12"/>
-          </p:nvPr>
-        </p:nvSpPr>
-        <p:spPr>
-          <a:xfrm>
-            <a:off x="6334125" y="4793381"/>
-            <a:ext cx="418000" cy="350119"/>
-          </a:xfrm>
-          <a:prstGeom prst="rect">
-            <a:avLst/>
-          </a:prstGeom>
-        </p:spPr>
-        <p:txBody>
-          <a:bodyPr lIns="91425" tIns="91425" rIns="91425" bIns="91425" anchor="b" anchorCtr="0">
-            <a:noAutofit/>
-          </a:bodyPr>
-          <a:lstStyle/>
-          <a:p>
-            <a:r>
-              <a:rPr lang="en" dirty="0" smtClean="0">
-                <a:latin typeface="Britannic Bold" panose="020B0903060703020204" pitchFamily="34" charset="0"/>
-              </a:rPr>
-              <a:t>14</a:t>
-            </a:r>
-            <a:endParaRPr lang="en" dirty="0">
-              <a:latin typeface="Britannic Bold" panose="020B0903060703020204" pitchFamily="34" charset="0"/>
-            </a:endParaRPr>
-          </a:p>
-        </p:txBody>
-      </p:sp>
       <p:pic>
         <p:nvPicPr>
           <p:cNvPr id="8" name="Picture 7"/>
@@ -45405,6 +45552,246 @@
           </a:fontRef>
         </p:style>
       </p:cxnSp>
+      <p:sp>
+        <p:nvSpPr>
+          <p:cNvPr id="11" name="Shape 107"/>
+          <p:cNvSpPr txBox="1">
+            <a:spLocks/>
+          </p:cNvSpPr>
+          <p:nvPr/>
+        </p:nvSpPr>
+        <p:spPr>
+          <a:xfrm>
+            <a:off x="6513825" y="4793381"/>
+            <a:ext cx="238300" cy="350119"/>
+          </a:xfrm>
+          <a:prstGeom prst="rect">
+            <a:avLst/>
+          </a:prstGeom>
+          <a:noFill/>
+          <a:ln>
+            <a:noFill/>
+          </a:ln>
+        </p:spPr>
+        <p:txBody>
+          <a:bodyPr lIns="91425" tIns="91425" rIns="91425" bIns="91425" anchor="b" anchorCtr="0">
+            <a:noAutofit/>
+          </a:bodyPr>
+          <a:lstStyle>
+            <a:defPPr marR="0" lvl="0" algn="l" rtl="0">
+              <a:lnSpc>
+                <a:spcPct val="100000"/>
+              </a:lnSpc>
+              <a:spcBef>
+                <a:spcPts val="0"/>
+              </a:spcBef>
+              <a:spcAft>
+                <a:spcPts val="0"/>
+              </a:spcAft>
+            </a:defPPr>
+            <a:lvl1pPr marR="0" lvl="0" algn="l" rtl="0">
+              <a:lnSpc>
+                <a:spcPct val="100000"/>
+              </a:lnSpc>
+              <a:spcBef>
+                <a:spcPts val="0"/>
+              </a:spcBef>
+              <a:spcAft>
+                <a:spcPts val="0"/>
+              </a:spcAft>
+              <a:buNone/>
+              <a:defRPr sz="1400" b="0" i="0" u="none" strike="noStrike" cap="none">
+                <a:solidFill>
+                  <a:srgbClr val="000000"/>
+                </a:solidFill>
+                <a:latin typeface="Arial"/>
+                <a:ea typeface="Arial"/>
+                <a:cs typeface="Arial"/>
+                <a:sym typeface="Arial"/>
+              </a:defRPr>
+            </a:lvl1pPr>
+            <a:lvl2pPr marR="0" lvl="1" algn="l" rtl="0">
+              <a:lnSpc>
+                <a:spcPct val="100000"/>
+              </a:lnSpc>
+              <a:spcBef>
+                <a:spcPts val="0"/>
+              </a:spcBef>
+              <a:spcAft>
+                <a:spcPts val="0"/>
+              </a:spcAft>
+              <a:buNone/>
+              <a:defRPr sz="1400" b="0" i="0" u="none" strike="noStrike" cap="none">
+                <a:solidFill>
+                  <a:srgbClr val="000000"/>
+                </a:solidFill>
+                <a:latin typeface="Arial"/>
+                <a:ea typeface="Arial"/>
+                <a:cs typeface="Arial"/>
+                <a:sym typeface="Arial"/>
+              </a:defRPr>
+            </a:lvl2pPr>
+            <a:lvl3pPr marR="0" lvl="2" algn="l" rtl="0">
+              <a:lnSpc>
+                <a:spcPct val="100000"/>
+              </a:lnSpc>
+              <a:spcBef>
+                <a:spcPts val="0"/>
+              </a:spcBef>
+              <a:spcAft>
+                <a:spcPts val="0"/>
+              </a:spcAft>
+              <a:buNone/>
+              <a:defRPr sz="1400" b="0" i="0" u="none" strike="noStrike" cap="none">
+                <a:solidFill>
+                  <a:srgbClr val="000000"/>
+                </a:solidFill>
+                <a:latin typeface="Arial"/>
+                <a:ea typeface="Arial"/>
+                <a:cs typeface="Arial"/>
+                <a:sym typeface="Arial"/>
+              </a:defRPr>
+            </a:lvl3pPr>
+            <a:lvl4pPr marR="0" lvl="3" algn="l" rtl="0">
+              <a:lnSpc>
+                <a:spcPct val="100000"/>
+              </a:lnSpc>
+              <a:spcBef>
+                <a:spcPts val="0"/>
+              </a:spcBef>
+              <a:spcAft>
+                <a:spcPts val="0"/>
+              </a:spcAft>
+              <a:buNone/>
+              <a:defRPr sz="1400" b="0" i="0" u="none" strike="noStrike" cap="none">
+                <a:solidFill>
+                  <a:srgbClr val="000000"/>
+                </a:solidFill>
+                <a:latin typeface="Arial"/>
+                <a:ea typeface="Arial"/>
+                <a:cs typeface="Arial"/>
+                <a:sym typeface="Arial"/>
+              </a:defRPr>
+            </a:lvl4pPr>
+            <a:lvl5pPr marR="0" lvl="4" algn="l" rtl="0">
+              <a:lnSpc>
+                <a:spcPct val="100000"/>
+              </a:lnSpc>
+              <a:spcBef>
+                <a:spcPts val="0"/>
+              </a:spcBef>
+              <a:spcAft>
+                <a:spcPts val="0"/>
+              </a:spcAft>
+              <a:buNone/>
+              <a:defRPr sz="1400" b="0" i="0" u="none" strike="noStrike" cap="none">
+                <a:solidFill>
+                  <a:srgbClr val="000000"/>
+                </a:solidFill>
+                <a:latin typeface="Arial"/>
+                <a:ea typeface="Arial"/>
+                <a:cs typeface="Arial"/>
+                <a:sym typeface="Arial"/>
+              </a:defRPr>
+            </a:lvl5pPr>
+            <a:lvl6pPr marR="0" lvl="5" algn="l" rtl="0">
+              <a:lnSpc>
+                <a:spcPct val="100000"/>
+              </a:lnSpc>
+              <a:spcBef>
+                <a:spcPts val="0"/>
+              </a:spcBef>
+              <a:spcAft>
+                <a:spcPts val="0"/>
+              </a:spcAft>
+              <a:buNone/>
+              <a:defRPr sz="1400" b="0" i="0" u="none" strike="noStrike" cap="none">
+                <a:solidFill>
+                  <a:srgbClr val="000000"/>
+                </a:solidFill>
+                <a:latin typeface="Arial"/>
+                <a:ea typeface="Arial"/>
+                <a:cs typeface="Arial"/>
+                <a:sym typeface="Arial"/>
+              </a:defRPr>
+            </a:lvl6pPr>
+            <a:lvl7pPr marR="0" lvl="6" algn="l" rtl="0">
+              <a:lnSpc>
+                <a:spcPct val="100000"/>
+              </a:lnSpc>
+              <a:spcBef>
+                <a:spcPts val="0"/>
+              </a:spcBef>
+              <a:spcAft>
+                <a:spcPts val="0"/>
+              </a:spcAft>
+              <a:buNone/>
+              <a:defRPr sz="1400" b="0" i="0" u="none" strike="noStrike" cap="none">
+                <a:solidFill>
+                  <a:srgbClr val="000000"/>
+                </a:solidFill>
+                <a:latin typeface="Arial"/>
+                <a:ea typeface="Arial"/>
+                <a:cs typeface="Arial"/>
+                <a:sym typeface="Arial"/>
+              </a:defRPr>
+            </a:lvl7pPr>
+            <a:lvl8pPr marR="0" lvl="7" algn="l" rtl="0">
+              <a:lnSpc>
+                <a:spcPct val="100000"/>
+              </a:lnSpc>
+              <a:spcBef>
+                <a:spcPts val="0"/>
+              </a:spcBef>
+              <a:spcAft>
+                <a:spcPts val="0"/>
+              </a:spcAft>
+              <a:buNone/>
+              <a:defRPr sz="1400" b="0" i="0" u="none" strike="noStrike" cap="none">
+                <a:solidFill>
+                  <a:srgbClr val="000000"/>
+                </a:solidFill>
+                <a:latin typeface="Arial"/>
+                <a:ea typeface="Arial"/>
+                <a:cs typeface="Arial"/>
+                <a:sym typeface="Arial"/>
+              </a:defRPr>
+            </a:lvl8pPr>
+            <a:lvl9pPr marR="0" lvl="8" algn="l" rtl="0">
+              <a:lnSpc>
+                <a:spcPct val="100000"/>
+              </a:lnSpc>
+              <a:spcBef>
+                <a:spcPts val="0"/>
+              </a:spcBef>
+              <a:spcAft>
+                <a:spcPts val="0"/>
+              </a:spcAft>
+              <a:buNone/>
+              <a:defRPr sz="1400" b="0" i="0" u="none" strike="noStrike" cap="none">
+                <a:solidFill>
+                  <a:srgbClr val="000000"/>
+                </a:solidFill>
+                <a:latin typeface="Arial"/>
+                <a:ea typeface="Arial"/>
+                <a:cs typeface="Arial"/>
+                <a:sym typeface="Arial"/>
+              </a:defRPr>
+            </a:lvl9pPr>
+          </a:lstStyle>
+          <a:p>
+            <a:r>
+              <a:rPr lang="en" dirty="0" smtClean="0">
+                <a:latin typeface="Britannic Bold" panose="020B0903060703020204" pitchFamily="34" charset="0"/>
+              </a:rPr>
+              <a:t>9</a:t>
+            </a:r>
+            <a:endParaRPr lang="en" dirty="0">
+              <a:latin typeface="Britannic Bold" panose="020B0903060703020204" pitchFamily="34" charset="0"/>
+            </a:endParaRPr>
+          </a:p>
+        </p:txBody>
+      </p:sp>
     </p:spTree>
     <p:extLst>
       <p:ext uri="{BB962C8B-B14F-4D97-AF65-F5344CB8AC3E}">

</xml_diff>